<commit_message>
[COP] Make commentare reference in meta model recursive
</commit_message>
<xml_diff>
--- a/COP18/images/metamodel.pptx
+++ b/COP18/images/metamodel.pptx
@@ -5,7 +5,8 @@
     <p:sldMasterId id="2147483672" r:id="rId1"/>
   </p:sldMasterIdLst>
   <p:sldIdLst>
-    <p:sldId id="256" r:id="rId2"/>
+    <p:sldId id="257" r:id="rId2"/>
+    <p:sldId id="256" r:id="rId3"/>
   </p:sldIdLst>
   <p:sldSz cx="9144000" cy="5143500" type="screen16x9"/>
   <p:notesSz cx="6858000" cy="9144000"/>
@@ -2975,6 +2976,953 @@
       </p:grpSpPr>
       <p:sp>
         <p:nvSpPr>
+          <p:cNvPr id="5" name="Rechteck 4">
+            <a:extLst>
+              <a:ext uri="{FF2B5EF4-FFF2-40B4-BE49-F238E27FC236}">
+                <a16:creationId xmlns:a16="http://schemas.microsoft.com/office/drawing/2014/main" id="{BE22AC22-ECE2-4641-B55D-3442772A8907}"/>
+              </a:ext>
+            </a:extLst>
+          </p:cNvPr>
+          <p:cNvSpPr/>
+          <p:nvPr/>
+        </p:nvSpPr>
+        <p:spPr>
+          <a:xfrm>
+            <a:off x="2505126" y="85412"/>
+            <a:ext cx="3756991" cy="1123121"/>
+          </a:xfrm>
+          <a:prstGeom prst="rect">
+            <a:avLst/>
+          </a:prstGeom>
+          <a:solidFill>
+            <a:schemeClr val="bg1"/>
+          </a:solidFill>
+          <a:ln w="38100">
+            <a:solidFill>
+              <a:schemeClr val="tx1"/>
+            </a:solidFill>
+          </a:ln>
+        </p:spPr>
+        <p:style>
+          <a:lnRef idx="2">
+            <a:schemeClr val="accent1">
+              <a:shade val="50000"/>
+            </a:schemeClr>
+          </a:lnRef>
+          <a:fillRef idx="1">
+            <a:schemeClr val="accent1"/>
+          </a:fillRef>
+          <a:effectRef idx="0">
+            <a:schemeClr val="accent1"/>
+          </a:effectRef>
+          <a:fontRef idx="minor">
+            <a:schemeClr val="lt1"/>
+          </a:fontRef>
+        </p:style>
+        <p:txBody>
+          <a:bodyPr rot="0" spcFirstLastPara="0" vertOverflow="overflow" horzOverflow="overflow" vert="horz" wrap="square" lIns="91440" tIns="45720" rIns="91440" bIns="45720" numCol="1" spcCol="0" rtlCol="0" fromWordArt="0" anchor="ctr" anchorCtr="0" forceAA="0" compatLnSpc="1">
+            <a:prstTxWarp prst="textNoShape">
+              <a:avLst/>
+            </a:prstTxWarp>
+            <a:noAutofit/>
+          </a:bodyPr>
+          <a:lstStyle/>
+          <a:p>
+            <a:pPr algn="ctr"/>
+            <a:r>
+              <a:rPr lang="en-US" sz="2800" b="1" i="1" dirty="0">
+                <a:solidFill>
+                  <a:schemeClr val="tx1"/>
+                </a:solidFill>
+                <a:latin typeface="Linux Libertine" panose="02000503000000000000" pitchFamily="2" charset="0"/>
+                <a:ea typeface="Linux Libertine" panose="02000503000000000000" pitchFamily="2" charset="0"/>
+                <a:cs typeface="Linux Libertine" panose="02000503000000000000" pitchFamily="2" charset="0"/>
+              </a:rPr>
+              <a:t>Development Artifact</a:t>
+            </a:r>
+          </a:p>
+        </p:txBody>
+      </p:sp>
+      <p:sp>
+        <p:nvSpPr>
+          <p:cNvPr id="6" name="Rechteck 5">
+            <a:extLst>
+              <a:ext uri="{FF2B5EF4-FFF2-40B4-BE49-F238E27FC236}">
+                <a16:creationId xmlns:a16="http://schemas.microsoft.com/office/drawing/2014/main" id="{D0F49886-ABF7-4918-B2E2-A0B11AB62A7F}"/>
+              </a:ext>
+            </a:extLst>
+          </p:cNvPr>
+          <p:cNvSpPr/>
+          <p:nvPr/>
+        </p:nvSpPr>
+        <p:spPr>
+          <a:xfrm>
+            <a:off x="211119" y="2019440"/>
+            <a:ext cx="3756991" cy="1123121"/>
+          </a:xfrm>
+          <a:prstGeom prst="rect">
+            <a:avLst/>
+          </a:prstGeom>
+          <a:solidFill>
+            <a:schemeClr val="bg1"/>
+          </a:solidFill>
+          <a:ln w="38100">
+            <a:solidFill>
+              <a:schemeClr val="tx1"/>
+            </a:solidFill>
+          </a:ln>
+        </p:spPr>
+        <p:style>
+          <a:lnRef idx="2">
+            <a:schemeClr val="accent1">
+              <a:shade val="50000"/>
+            </a:schemeClr>
+          </a:lnRef>
+          <a:fillRef idx="1">
+            <a:schemeClr val="accent1"/>
+          </a:fillRef>
+          <a:effectRef idx="0">
+            <a:schemeClr val="accent1"/>
+          </a:effectRef>
+          <a:fontRef idx="minor">
+            <a:schemeClr val="lt1"/>
+          </a:fontRef>
+        </p:style>
+        <p:txBody>
+          <a:bodyPr rot="0" spcFirstLastPara="0" vertOverflow="overflow" horzOverflow="overflow" vert="horz" wrap="square" lIns="91440" tIns="45720" rIns="91440" bIns="45720" numCol="1" spcCol="0" rtlCol="0" fromWordArt="0" anchor="ctr" anchorCtr="0" forceAA="0" compatLnSpc="1">
+            <a:prstTxWarp prst="textNoShape">
+              <a:avLst/>
+            </a:prstTxWarp>
+            <a:noAutofit/>
+          </a:bodyPr>
+          <a:lstStyle/>
+          <a:p>
+            <a:pPr algn="ctr"/>
+            <a:r>
+              <a:rPr lang="en-US" sz="2800" b="1" i="1" dirty="0">
+                <a:solidFill>
+                  <a:schemeClr val="tx1"/>
+                </a:solidFill>
+                <a:latin typeface="Linux Libertine" panose="02000503000000000000" pitchFamily="2" charset="0"/>
+                <a:ea typeface="Linux Libertine" panose="02000503000000000000" pitchFamily="2" charset="0"/>
+                <a:cs typeface="Linux Libertine" panose="02000503000000000000" pitchFamily="2" charset="0"/>
+              </a:rPr>
+              <a:t>executable</a:t>
+            </a:r>
+          </a:p>
+          <a:p>
+            <a:pPr algn="ctr"/>
+            <a:r>
+              <a:rPr lang="en-US" sz="2800" b="1" i="1" dirty="0">
+                <a:solidFill>
+                  <a:schemeClr val="tx1"/>
+                </a:solidFill>
+                <a:latin typeface="Linux Libertine" panose="02000503000000000000" pitchFamily="2" charset="0"/>
+                <a:ea typeface="Linux Libertine" panose="02000503000000000000" pitchFamily="2" charset="0"/>
+                <a:cs typeface="Linux Libertine" panose="02000503000000000000" pitchFamily="2" charset="0"/>
+              </a:rPr>
+              <a:t>Development Artifact</a:t>
+            </a:r>
+          </a:p>
+        </p:txBody>
+      </p:sp>
+      <p:sp>
+        <p:nvSpPr>
+          <p:cNvPr id="7" name="Rechteck 6">
+            <a:extLst>
+              <a:ext uri="{FF2B5EF4-FFF2-40B4-BE49-F238E27FC236}">
+                <a16:creationId xmlns:a16="http://schemas.microsoft.com/office/drawing/2014/main" id="{94E5F5F6-50B1-425D-9ACE-90A3A9CC9A7D}"/>
+              </a:ext>
+            </a:extLst>
+          </p:cNvPr>
+          <p:cNvSpPr/>
+          <p:nvPr/>
+        </p:nvSpPr>
+        <p:spPr>
+          <a:xfrm>
+            <a:off x="4799135" y="2019439"/>
+            <a:ext cx="3756991" cy="1123121"/>
+          </a:xfrm>
+          <a:prstGeom prst="rect">
+            <a:avLst/>
+          </a:prstGeom>
+          <a:solidFill>
+            <a:schemeClr val="bg1"/>
+          </a:solidFill>
+          <a:ln w="38100">
+            <a:solidFill>
+              <a:schemeClr val="tx1"/>
+            </a:solidFill>
+          </a:ln>
+        </p:spPr>
+        <p:style>
+          <a:lnRef idx="2">
+            <a:schemeClr val="accent1">
+              <a:shade val="50000"/>
+            </a:schemeClr>
+          </a:lnRef>
+          <a:fillRef idx="1">
+            <a:schemeClr val="accent1"/>
+          </a:fillRef>
+          <a:effectRef idx="0">
+            <a:schemeClr val="accent1"/>
+          </a:effectRef>
+          <a:fontRef idx="minor">
+            <a:schemeClr val="lt1"/>
+          </a:fontRef>
+        </p:style>
+        <p:txBody>
+          <a:bodyPr rot="0" spcFirstLastPara="0" vertOverflow="overflow" horzOverflow="overflow" vert="horz" wrap="square" lIns="91440" tIns="45720" rIns="91440" bIns="45720" numCol="1" spcCol="0" rtlCol="0" fromWordArt="0" anchor="ctr" anchorCtr="0" forceAA="0" compatLnSpc="1">
+            <a:prstTxWarp prst="textNoShape">
+              <a:avLst/>
+            </a:prstTxWarp>
+            <a:noAutofit/>
+          </a:bodyPr>
+          <a:lstStyle/>
+          <a:p>
+            <a:pPr algn="ctr"/>
+            <a:r>
+              <a:rPr lang="en-US" sz="2800" b="1" i="1" dirty="0">
+                <a:solidFill>
+                  <a:schemeClr val="tx1"/>
+                </a:solidFill>
+                <a:latin typeface="Linux Libertine" panose="02000503000000000000" pitchFamily="2" charset="0"/>
+                <a:ea typeface="Linux Libertine" panose="02000503000000000000" pitchFamily="2" charset="0"/>
+                <a:cs typeface="Linux Libertine" panose="02000503000000000000" pitchFamily="2" charset="0"/>
+              </a:rPr>
+              <a:t>Non-executable</a:t>
+            </a:r>
+          </a:p>
+          <a:p>
+            <a:pPr algn="ctr"/>
+            <a:r>
+              <a:rPr lang="en-US" sz="2800" b="1" i="1" dirty="0">
+                <a:solidFill>
+                  <a:schemeClr val="tx1"/>
+                </a:solidFill>
+                <a:latin typeface="Linux Libertine" panose="02000503000000000000" pitchFamily="2" charset="0"/>
+                <a:ea typeface="Linux Libertine" panose="02000503000000000000" pitchFamily="2" charset="0"/>
+                <a:cs typeface="Linux Libertine" panose="02000503000000000000" pitchFamily="2" charset="0"/>
+              </a:rPr>
+              <a:t>Development Artifact</a:t>
+            </a:r>
+          </a:p>
+        </p:txBody>
+      </p:sp>
+      <p:sp>
+        <p:nvSpPr>
+          <p:cNvPr id="8" name="Rechteck 7">
+            <a:extLst>
+              <a:ext uri="{FF2B5EF4-FFF2-40B4-BE49-F238E27FC236}">
+                <a16:creationId xmlns:a16="http://schemas.microsoft.com/office/drawing/2014/main" id="{20E9C5D5-49FE-45BE-B639-1440E36B6747}"/>
+              </a:ext>
+            </a:extLst>
+          </p:cNvPr>
+          <p:cNvSpPr/>
+          <p:nvPr/>
+        </p:nvSpPr>
+        <p:spPr>
+          <a:xfrm>
+            <a:off x="211119" y="3926098"/>
+            <a:ext cx="3756991" cy="1123121"/>
+          </a:xfrm>
+          <a:prstGeom prst="rect">
+            <a:avLst/>
+          </a:prstGeom>
+          <a:solidFill>
+            <a:schemeClr val="bg1"/>
+          </a:solidFill>
+          <a:ln w="38100">
+            <a:solidFill>
+              <a:schemeClr val="tx1"/>
+            </a:solidFill>
+          </a:ln>
+        </p:spPr>
+        <p:style>
+          <a:lnRef idx="2">
+            <a:schemeClr val="accent1">
+              <a:shade val="50000"/>
+            </a:schemeClr>
+          </a:lnRef>
+          <a:fillRef idx="1">
+            <a:schemeClr val="accent1"/>
+          </a:fillRef>
+          <a:effectRef idx="0">
+            <a:schemeClr val="accent1"/>
+          </a:effectRef>
+          <a:fontRef idx="minor">
+            <a:schemeClr val="lt1"/>
+          </a:fontRef>
+        </p:style>
+        <p:txBody>
+          <a:bodyPr rot="0" spcFirstLastPara="0" vertOverflow="overflow" horzOverflow="overflow" vert="horz" wrap="square" lIns="91440" tIns="45720" rIns="91440" bIns="45720" numCol="1" spcCol="0" rtlCol="0" fromWordArt="0" anchor="ctr" anchorCtr="0" forceAA="0" compatLnSpc="1">
+            <a:prstTxWarp prst="textNoShape">
+              <a:avLst/>
+            </a:prstTxWarp>
+            <a:noAutofit/>
+          </a:bodyPr>
+          <a:lstStyle/>
+          <a:p>
+            <a:pPr algn="ctr"/>
+            <a:r>
+              <a:rPr lang="en-US" sz="2800" b="1" dirty="0">
+                <a:solidFill>
+                  <a:schemeClr val="tx1"/>
+                </a:solidFill>
+                <a:latin typeface="Linux Libertine" panose="02000503000000000000" pitchFamily="2" charset="0"/>
+                <a:ea typeface="Linux Libertine" panose="02000503000000000000" pitchFamily="2" charset="0"/>
+                <a:cs typeface="Linux Libertine" panose="02000503000000000000" pitchFamily="2" charset="0"/>
+              </a:rPr>
+              <a:t>Meta Object</a:t>
+            </a:r>
+          </a:p>
+        </p:txBody>
+      </p:sp>
+      <p:sp>
+        <p:nvSpPr>
+          <p:cNvPr id="9" name="Rechteck 8">
+            <a:extLst>
+              <a:ext uri="{FF2B5EF4-FFF2-40B4-BE49-F238E27FC236}">
+                <a16:creationId xmlns:a16="http://schemas.microsoft.com/office/drawing/2014/main" id="{6623A49B-735A-4374-9094-1B3B50C89298}"/>
+              </a:ext>
+            </a:extLst>
+          </p:cNvPr>
+          <p:cNvSpPr/>
+          <p:nvPr/>
+        </p:nvSpPr>
+        <p:spPr>
+          <a:xfrm>
+            <a:off x="4799135" y="3926098"/>
+            <a:ext cx="3756991" cy="1123121"/>
+          </a:xfrm>
+          <a:prstGeom prst="rect">
+            <a:avLst/>
+          </a:prstGeom>
+          <a:solidFill>
+            <a:schemeClr val="bg1"/>
+          </a:solidFill>
+          <a:ln w="38100">
+            <a:solidFill>
+              <a:schemeClr val="tx1"/>
+            </a:solidFill>
+          </a:ln>
+        </p:spPr>
+        <p:style>
+          <a:lnRef idx="2">
+            <a:schemeClr val="accent1">
+              <a:shade val="50000"/>
+            </a:schemeClr>
+          </a:lnRef>
+          <a:fillRef idx="1">
+            <a:schemeClr val="accent1"/>
+          </a:fillRef>
+          <a:effectRef idx="0">
+            <a:schemeClr val="accent1"/>
+          </a:effectRef>
+          <a:fontRef idx="minor">
+            <a:schemeClr val="lt1"/>
+          </a:fontRef>
+        </p:style>
+        <p:txBody>
+          <a:bodyPr rot="0" spcFirstLastPara="0" vertOverflow="overflow" horzOverflow="overflow" vert="horz" wrap="square" lIns="91440" tIns="45720" rIns="91440" bIns="45720" numCol="1" spcCol="0" rtlCol="0" fromWordArt="0" anchor="ctr" anchorCtr="0" forceAA="0" compatLnSpc="1">
+            <a:prstTxWarp prst="textNoShape">
+              <a:avLst/>
+            </a:prstTxWarp>
+            <a:noAutofit/>
+          </a:bodyPr>
+          <a:lstStyle/>
+          <a:p>
+            <a:pPr algn="ctr"/>
+            <a:r>
+              <a:rPr lang="en-US" sz="2800" b="1" dirty="0">
+                <a:solidFill>
+                  <a:schemeClr val="tx1"/>
+                </a:solidFill>
+                <a:latin typeface="Linux Libertine" panose="02000503000000000000" pitchFamily="2" charset="0"/>
+                <a:ea typeface="Linux Libertine" panose="02000503000000000000" pitchFamily="2" charset="0"/>
+                <a:cs typeface="Linux Libertine" panose="02000503000000000000" pitchFamily="2" charset="0"/>
+              </a:rPr>
+              <a:t>Commentary</a:t>
+            </a:r>
+          </a:p>
+        </p:txBody>
+      </p:sp>
+      <p:sp>
+        <p:nvSpPr>
+          <p:cNvPr id="10" name="Gleichschenkliges Dreieck 9">
+            <a:extLst>
+              <a:ext uri="{FF2B5EF4-FFF2-40B4-BE49-F238E27FC236}">
+                <a16:creationId xmlns:a16="http://schemas.microsoft.com/office/drawing/2014/main" id="{C979CAED-99FD-45B0-A71A-53FC281BDADD}"/>
+              </a:ext>
+            </a:extLst>
+          </p:cNvPr>
+          <p:cNvSpPr/>
+          <p:nvPr/>
+        </p:nvSpPr>
+        <p:spPr>
+          <a:xfrm>
+            <a:off x="4129342" y="1251888"/>
+            <a:ext cx="508554" cy="438409"/>
+          </a:xfrm>
+          <a:prstGeom prst="triangle">
+            <a:avLst/>
+          </a:prstGeom>
+          <a:noFill/>
+          <a:ln w="38100">
+            <a:solidFill>
+              <a:schemeClr val="tx1"/>
+            </a:solidFill>
+          </a:ln>
+        </p:spPr>
+        <p:style>
+          <a:lnRef idx="2">
+            <a:schemeClr val="accent1">
+              <a:shade val="50000"/>
+            </a:schemeClr>
+          </a:lnRef>
+          <a:fillRef idx="1">
+            <a:schemeClr val="accent1"/>
+          </a:fillRef>
+          <a:effectRef idx="0">
+            <a:schemeClr val="accent1"/>
+          </a:effectRef>
+          <a:fontRef idx="minor">
+            <a:schemeClr val="lt1"/>
+          </a:fontRef>
+        </p:style>
+        <p:txBody>
+          <a:bodyPr rot="0" spcFirstLastPara="0" vertOverflow="overflow" horzOverflow="overflow" vert="horz" wrap="square" lIns="91440" tIns="45720" rIns="91440" bIns="45720" numCol="1" spcCol="0" rtlCol="0" fromWordArt="0" anchor="ctr" anchorCtr="0" forceAA="0" compatLnSpc="1">
+            <a:prstTxWarp prst="textNoShape">
+              <a:avLst/>
+            </a:prstTxWarp>
+            <a:noAutofit/>
+          </a:bodyPr>
+          <a:lstStyle/>
+          <a:p>
+            <a:pPr algn="ctr"/>
+            <a:endParaRPr lang="en-US" sz="1600" b="1">
+              <a:latin typeface="Linux Libertine" panose="02000503000000000000" pitchFamily="2" charset="0"/>
+              <a:ea typeface="Linux Libertine" panose="02000503000000000000" pitchFamily="2" charset="0"/>
+              <a:cs typeface="Linux Libertine" panose="02000503000000000000" pitchFamily="2" charset="0"/>
+            </a:endParaRPr>
+          </a:p>
+        </p:txBody>
+      </p:sp>
+      <p:cxnSp>
+        <p:nvCxnSpPr>
+          <p:cNvPr id="12" name="Verbinder: gewinkelt 11">
+            <a:extLst>
+              <a:ext uri="{FF2B5EF4-FFF2-40B4-BE49-F238E27FC236}">
+                <a16:creationId xmlns:a16="http://schemas.microsoft.com/office/drawing/2014/main" id="{5C0E94D4-B69C-43D7-9961-210EAE3F0178}"/>
+              </a:ext>
+            </a:extLst>
+          </p:cNvPr>
+          <p:cNvCxnSpPr>
+            <a:cxnSpLocks/>
+            <a:stCxn id="10" idx="3"/>
+            <a:endCxn id="7" idx="0"/>
+          </p:cNvCxnSpPr>
+          <p:nvPr/>
+        </p:nvCxnSpPr>
+        <p:spPr>
+          <a:xfrm rot="16200000" flipH="1">
+            <a:off x="5366052" y="707863"/>
+            <a:ext cx="329142" cy="2294009"/>
+          </a:xfrm>
+          <a:prstGeom prst="bentConnector3">
+            <a:avLst/>
+          </a:prstGeom>
+          <a:ln w="38100">
+            <a:solidFill>
+              <a:schemeClr val="tx1"/>
+            </a:solidFill>
+          </a:ln>
+        </p:spPr>
+        <p:style>
+          <a:lnRef idx="1">
+            <a:schemeClr val="accent1"/>
+          </a:lnRef>
+          <a:fillRef idx="0">
+            <a:schemeClr val="accent1"/>
+          </a:fillRef>
+          <a:effectRef idx="0">
+            <a:schemeClr val="accent1"/>
+          </a:effectRef>
+          <a:fontRef idx="minor">
+            <a:schemeClr val="tx1"/>
+          </a:fontRef>
+        </p:style>
+      </p:cxnSp>
+      <p:cxnSp>
+        <p:nvCxnSpPr>
+          <p:cNvPr id="13" name="Verbinder: gewinkelt 12">
+            <a:extLst>
+              <a:ext uri="{FF2B5EF4-FFF2-40B4-BE49-F238E27FC236}">
+                <a16:creationId xmlns:a16="http://schemas.microsoft.com/office/drawing/2014/main" id="{C42BB661-853F-4C3C-96E5-F9247D7E383E}"/>
+              </a:ext>
+            </a:extLst>
+          </p:cNvPr>
+          <p:cNvCxnSpPr>
+            <a:cxnSpLocks/>
+            <a:stCxn id="10" idx="3"/>
+            <a:endCxn id="6" idx="0"/>
+          </p:cNvCxnSpPr>
+          <p:nvPr/>
+        </p:nvCxnSpPr>
+        <p:spPr>
+          <a:xfrm rot="5400000">
+            <a:off x="3072048" y="707865"/>
+            <a:ext cx="329143" cy="2294007"/>
+          </a:xfrm>
+          <a:prstGeom prst="bentConnector3">
+            <a:avLst>
+              <a:gd name="adj1" fmla="val 50000"/>
+            </a:avLst>
+          </a:prstGeom>
+          <a:ln w="38100">
+            <a:solidFill>
+              <a:schemeClr val="tx1"/>
+            </a:solidFill>
+          </a:ln>
+        </p:spPr>
+        <p:style>
+          <a:lnRef idx="1">
+            <a:schemeClr val="accent1"/>
+          </a:lnRef>
+          <a:fillRef idx="0">
+            <a:schemeClr val="accent1"/>
+          </a:fillRef>
+          <a:effectRef idx="0">
+            <a:schemeClr val="accent1"/>
+          </a:effectRef>
+          <a:fontRef idx="minor">
+            <a:schemeClr val="tx1"/>
+          </a:fontRef>
+        </p:style>
+      </p:cxnSp>
+      <p:sp>
+        <p:nvSpPr>
+          <p:cNvPr id="16" name="Gleichschenkliges Dreieck 15">
+            <a:extLst>
+              <a:ext uri="{FF2B5EF4-FFF2-40B4-BE49-F238E27FC236}">
+                <a16:creationId xmlns:a16="http://schemas.microsoft.com/office/drawing/2014/main" id="{275DE645-F634-4E70-94C3-EA12F1628651}"/>
+              </a:ext>
+            </a:extLst>
+          </p:cNvPr>
+          <p:cNvSpPr/>
+          <p:nvPr/>
+        </p:nvSpPr>
+        <p:spPr>
+          <a:xfrm>
+            <a:off x="6423349" y="3160785"/>
+            <a:ext cx="508554" cy="438409"/>
+          </a:xfrm>
+          <a:prstGeom prst="triangle">
+            <a:avLst/>
+          </a:prstGeom>
+          <a:noFill/>
+          <a:ln w="38100">
+            <a:solidFill>
+              <a:schemeClr val="tx1"/>
+            </a:solidFill>
+          </a:ln>
+        </p:spPr>
+        <p:style>
+          <a:lnRef idx="2">
+            <a:schemeClr val="accent1">
+              <a:shade val="50000"/>
+            </a:schemeClr>
+          </a:lnRef>
+          <a:fillRef idx="1">
+            <a:schemeClr val="accent1"/>
+          </a:fillRef>
+          <a:effectRef idx="0">
+            <a:schemeClr val="accent1"/>
+          </a:effectRef>
+          <a:fontRef idx="minor">
+            <a:schemeClr val="lt1"/>
+          </a:fontRef>
+        </p:style>
+        <p:txBody>
+          <a:bodyPr rot="0" spcFirstLastPara="0" vertOverflow="overflow" horzOverflow="overflow" vert="horz" wrap="square" lIns="91440" tIns="45720" rIns="91440" bIns="45720" numCol="1" spcCol="0" rtlCol="0" fromWordArt="0" anchor="ctr" anchorCtr="0" forceAA="0" compatLnSpc="1">
+            <a:prstTxWarp prst="textNoShape">
+              <a:avLst/>
+            </a:prstTxWarp>
+            <a:noAutofit/>
+          </a:bodyPr>
+          <a:lstStyle/>
+          <a:p>
+            <a:pPr algn="ctr"/>
+            <a:endParaRPr lang="en-US" sz="1600" b="1">
+              <a:latin typeface="Linux Libertine" panose="02000503000000000000" pitchFamily="2" charset="0"/>
+              <a:ea typeface="Linux Libertine" panose="02000503000000000000" pitchFamily="2" charset="0"/>
+              <a:cs typeface="Linux Libertine" panose="02000503000000000000" pitchFamily="2" charset="0"/>
+            </a:endParaRPr>
+          </a:p>
+        </p:txBody>
+      </p:sp>
+      <p:sp>
+        <p:nvSpPr>
+          <p:cNvPr id="17" name="Gleichschenkliges Dreieck 16">
+            <a:extLst>
+              <a:ext uri="{FF2B5EF4-FFF2-40B4-BE49-F238E27FC236}">
+                <a16:creationId xmlns:a16="http://schemas.microsoft.com/office/drawing/2014/main" id="{31A01926-F436-4221-BC51-3B32442167B7}"/>
+              </a:ext>
+            </a:extLst>
+          </p:cNvPr>
+          <p:cNvSpPr/>
+          <p:nvPr/>
+        </p:nvSpPr>
+        <p:spPr>
+          <a:xfrm>
+            <a:off x="1835336" y="3160785"/>
+            <a:ext cx="508554" cy="438409"/>
+          </a:xfrm>
+          <a:prstGeom prst="triangle">
+            <a:avLst/>
+          </a:prstGeom>
+          <a:noFill/>
+          <a:ln w="38100">
+            <a:solidFill>
+              <a:schemeClr val="tx1"/>
+            </a:solidFill>
+          </a:ln>
+        </p:spPr>
+        <p:style>
+          <a:lnRef idx="2">
+            <a:schemeClr val="accent1">
+              <a:shade val="50000"/>
+            </a:schemeClr>
+          </a:lnRef>
+          <a:fillRef idx="1">
+            <a:schemeClr val="accent1"/>
+          </a:fillRef>
+          <a:effectRef idx="0">
+            <a:schemeClr val="accent1"/>
+          </a:effectRef>
+          <a:fontRef idx="minor">
+            <a:schemeClr val="lt1"/>
+          </a:fontRef>
+        </p:style>
+        <p:txBody>
+          <a:bodyPr rot="0" spcFirstLastPara="0" vertOverflow="overflow" horzOverflow="overflow" vert="horz" wrap="square" lIns="91440" tIns="45720" rIns="91440" bIns="45720" numCol="1" spcCol="0" rtlCol="0" fromWordArt="0" anchor="ctr" anchorCtr="0" forceAA="0" compatLnSpc="1">
+            <a:prstTxWarp prst="textNoShape">
+              <a:avLst/>
+            </a:prstTxWarp>
+            <a:noAutofit/>
+          </a:bodyPr>
+          <a:lstStyle/>
+          <a:p>
+            <a:pPr algn="ctr"/>
+            <a:endParaRPr lang="en-US" sz="1600" b="1">
+              <a:latin typeface="Linux Libertine" panose="02000503000000000000" pitchFamily="2" charset="0"/>
+              <a:ea typeface="Linux Libertine" panose="02000503000000000000" pitchFamily="2" charset="0"/>
+              <a:cs typeface="Linux Libertine" panose="02000503000000000000" pitchFamily="2" charset="0"/>
+            </a:endParaRPr>
+          </a:p>
+        </p:txBody>
+      </p:sp>
+      <p:cxnSp>
+        <p:nvCxnSpPr>
+          <p:cNvPr id="19" name="Gerader Verbinder 18">
+            <a:extLst>
+              <a:ext uri="{FF2B5EF4-FFF2-40B4-BE49-F238E27FC236}">
+                <a16:creationId xmlns:a16="http://schemas.microsoft.com/office/drawing/2014/main" id="{C62D66E9-3FA2-41DD-B5B4-DAB429ACD9A7}"/>
+              </a:ext>
+            </a:extLst>
+          </p:cNvPr>
+          <p:cNvCxnSpPr>
+            <a:cxnSpLocks/>
+            <a:stCxn id="17" idx="3"/>
+            <a:endCxn id="8" idx="0"/>
+          </p:cNvCxnSpPr>
+          <p:nvPr/>
+        </p:nvCxnSpPr>
+        <p:spPr>
+          <a:xfrm flipH="1">
+            <a:off x="2089615" y="3599191"/>
+            <a:ext cx="1" cy="326904"/>
+          </a:xfrm>
+          <a:prstGeom prst="line">
+            <a:avLst/>
+          </a:prstGeom>
+          <a:ln w="38100">
+            <a:solidFill>
+              <a:schemeClr val="tx1"/>
+            </a:solidFill>
+          </a:ln>
+        </p:spPr>
+        <p:style>
+          <a:lnRef idx="1">
+            <a:schemeClr val="accent1"/>
+          </a:lnRef>
+          <a:fillRef idx="0">
+            <a:schemeClr val="accent1"/>
+          </a:fillRef>
+          <a:effectRef idx="0">
+            <a:schemeClr val="accent1"/>
+          </a:effectRef>
+          <a:fontRef idx="minor">
+            <a:schemeClr val="tx1"/>
+          </a:fontRef>
+        </p:style>
+      </p:cxnSp>
+      <p:cxnSp>
+        <p:nvCxnSpPr>
+          <p:cNvPr id="20" name="Gerader Verbinder 19">
+            <a:extLst>
+              <a:ext uri="{FF2B5EF4-FFF2-40B4-BE49-F238E27FC236}">
+                <a16:creationId xmlns:a16="http://schemas.microsoft.com/office/drawing/2014/main" id="{61B65F92-3C8B-491D-A353-A3B7F74E9773}"/>
+              </a:ext>
+            </a:extLst>
+          </p:cNvPr>
+          <p:cNvCxnSpPr>
+            <a:cxnSpLocks/>
+            <a:stCxn id="16" idx="3"/>
+            <a:endCxn id="9" idx="0"/>
+          </p:cNvCxnSpPr>
+          <p:nvPr/>
+        </p:nvCxnSpPr>
+        <p:spPr>
+          <a:xfrm>
+            <a:off x="6677626" y="3599191"/>
+            <a:ext cx="2" cy="326904"/>
+          </a:xfrm>
+          <a:prstGeom prst="line">
+            <a:avLst/>
+          </a:prstGeom>
+          <a:ln w="38100">
+            <a:solidFill>
+              <a:schemeClr val="tx1"/>
+            </a:solidFill>
+          </a:ln>
+        </p:spPr>
+        <p:style>
+          <a:lnRef idx="1">
+            <a:schemeClr val="accent1"/>
+          </a:lnRef>
+          <a:fillRef idx="0">
+            <a:schemeClr val="accent1"/>
+          </a:fillRef>
+          <a:effectRef idx="0">
+            <a:schemeClr val="accent1"/>
+          </a:effectRef>
+          <a:fontRef idx="minor">
+            <a:schemeClr val="tx1"/>
+          </a:fontRef>
+        </p:style>
+      </p:cxnSp>
+      <p:sp>
+        <p:nvSpPr>
+          <p:cNvPr id="25" name="Textfeld 24">
+            <a:extLst>
+              <a:ext uri="{FF2B5EF4-FFF2-40B4-BE49-F238E27FC236}">
+                <a16:creationId xmlns:a16="http://schemas.microsoft.com/office/drawing/2014/main" id="{4D3412B7-ACCD-47DB-A630-8A67B29FE53A}"/>
+              </a:ext>
+            </a:extLst>
+          </p:cNvPr>
+          <p:cNvSpPr txBox="1"/>
+          <p:nvPr/>
+        </p:nvSpPr>
+        <p:spPr>
+          <a:xfrm>
+            <a:off x="8578611" y="4482670"/>
+            <a:ext cx="370614" cy="338554"/>
+          </a:xfrm>
+          <a:prstGeom prst="rect">
+            <a:avLst/>
+          </a:prstGeom>
+          <a:noFill/>
+          <a:ln w="38100">
+            <a:noFill/>
+          </a:ln>
+        </p:spPr>
+        <p:txBody>
+          <a:bodyPr wrap="none" rtlCol="0">
+            <a:spAutoFit/>
+          </a:bodyPr>
+          <a:lstStyle/>
+          <a:p>
+            <a:r>
+              <a:rPr lang="en-US" sz="1600" b="1" dirty="0">
+                <a:latin typeface="Linux Libertine" panose="02000503000000000000" pitchFamily="2" charset="0"/>
+                <a:ea typeface="Linux Libertine" panose="02000503000000000000" pitchFamily="2" charset="0"/>
+                <a:cs typeface="Linux Libertine" panose="02000503000000000000" pitchFamily="2" charset="0"/>
+              </a:rPr>
+              <a:t>m</a:t>
+            </a:r>
+          </a:p>
+        </p:txBody>
+      </p:sp>
+      <p:cxnSp>
+        <p:nvCxnSpPr>
+          <p:cNvPr id="26" name="Gerader Verbinder 25">
+            <a:extLst>
+              <a:ext uri="{FF2B5EF4-FFF2-40B4-BE49-F238E27FC236}">
+                <a16:creationId xmlns:a16="http://schemas.microsoft.com/office/drawing/2014/main" id="{E5DF7BAA-CEAF-4E1E-9AA9-EA35DB753BA8}"/>
+              </a:ext>
+            </a:extLst>
+          </p:cNvPr>
+          <p:cNvCxnSpPr>
+            <a:cxnSpLocks/>
+            <a:endCxn id="8" idx="0"/>
+          </p:cNvCxnSpPr>
+          <p:nvPr/>
+        </p:nvCxnSpPr>
+        <p:spPr>
+          <a:xfrm>
+            <a:off x="2089613" y="3599190"/>
+            <a:ext cx="2" cy="326908"/>
+          </a:xfrm>
+          <a:prstGeom prst="line">
+            <a:avLst/>
+          </a:prstGeom>
+          <a:ln w="38100">
+            <a:solidFill>
+              <a:schemeClr val="tx1"/>
+            </a:solidFill>
+          </a:ln>
+        </p:spPr>
+        <p:style>
+          <a:lnRef idx="1">
+            <a:schemeClr val="accent1"/>
+          </a:lnRef>
+          <a:fillRef idx="0">
+            <a:schemeClr val="accent1"/>
+          </a:fillRef>
+          <a:effectRef idx="0">
+            <a:schemeClr val="accent1"/>
+          </a:effectRef>
+          <a:fontRef idx="minor">
+            <a:schemeClr val="tx1"/>
+          </a:fontRef>
+        </p:style>
+      </p:cxnSp>
+      <p:sp>
+        <p:nvSpPr>
+          <p:cNvPr id="27" name="Textfeld 26">
+            <a:extLst>
+              <a:ext uri="{FF2B5EF4-FFF2-40B4-BE49-F238E27FC236}">
+                <a16:creationId xmlns:a16="http://schemas.microsoft.com/office/drawing/2014/main" id="{AACCBB20-225F-41BF-8F4B-9DF9B77F88EF}"/>
+              </a:ext>
+            </a:extLst>
+          </p:cNvPr>
+          <p:cNvSpPr txBox="1"/>
+          <p:nvPr/>
+        </p:nvSpPr>
+        <p:spPr>
+          <a:xfrm>
+            <a:off x="6267697" y="265064"/>
+            <a:ext cx="311304" cy="338554"/>
+          </a:xfrm>
+          <a:prstGeom prst="rect">
+            <a:avLst/>
+          </a:prstGeom>
+          <a:noFill/>
+          <a:ln w="38100">
+            <a:noFill/>
+          </a:ln>
+        </p:spPr>
+        <p:txBody>
+          <a:bodyPr wrap="none" rtlCol="0">
+            <a:spAutoFit/>
+          </a:bodyPr>
+          <a:lstStyle/>
+          <a:p>
+            <a:r>
+              <a:rPr lang="en-US" sz="1600" b="1" dirty="0">
+                <a:latin typeface="Linux Libertine" panose="02000503000000000000" pitchFamily="2" charset="0"/>
+                <a:ea typeface="Linux Libertine" panose="02000503000000000000" pitchFamily="2" charset="0"/>
+                <a:cs typeface="Linux Libertine" panose="02000503000000000000" pitchFamily="2" charset="0"/>
+              </a:rPr>
+              <a:t>n</a:t>
+            </a:r>
+          </a:p>
+        </p:txBody>
+      </p:sp>
+      <p:cxnSp>
+        <p:nvCxnSpPr>
+          <p:cNvPr id="3" name="Verbinder: gewinkelt 2">
+            <a:extLst>
+              <a:ext uri="{FF2B5EF4-FFF2-40B4-BE49-F238E27FC236}">
+                <a16:creationId xmlns:a16="http://schemas.microsoft.com/office/drawing/2014/main" id="{243A9AE8-EF70-4581-A95D-B32DD06E83EA}"/>
+              </a:ext>
+            </a:extLst>
+          </p:cNvPr>
+          <p:cNvCxnSpPr>
+            <a:stCxn id="9" idx="3"/>
+            <a:endCxn id="5" idx="3"/>
+          </p:cNvCxnSpPr>
+          <p:nvPr/>
+        </p:nvCxnSpPr>
+        <p:spPr>
+          <a:xfrm flipH="1" flipV="1">
+            <a:off x="6262117" y="646973"/>
+            <a:ext cx="2294009" cy="3840686"/>
+          </a:xfrm>
+          <a:prstGeom prst="bentConnector3">
+            <a:avLst>
+              <a:gd name="adj1" fmla="val -9965"/>
+            </a:avLst>
+          </a:prstGeom>
+          <a:ln w="38100">
+            <a:solidFill>
+              <a:schemeClr val="tx1">
+                <a:lumMod val="95000"/>
+                <a:lumOff val="5000"/>
+              </a:schemeClr>
+            </a:solidFill>
+            <a:headEnd type="none" w="med" len="med"/>
+            <a:tailEnd type="triangle" w="lg" len="lg"/>
+          </a:ln>
+        </p:spPr>
+        <p:style>
+          <a:lnRef idx="1">
+            <a:schemeClr val="accent1"/>
+          </a:lnRef>
+          <a:fillRef idx="0">
+            <a:schemeClr val="accent1"/>
+          </a:fillRef>
+          <a:effectRef idx="0">
+            <a:schemeClr val="accent1"/>
+          </a:effectRef>
+          <a:fontRef idx="minor">
+            <a:schemeClr val="tx1"/>
+          </a:fontRef>
+        </p:style>
+      </p:cxnSp>
+    </p:spTree>
+    <p:extLst>
+      <p:ext uri="{BB962C8B-B14F-4D97-AF65-F5344CB8AC3E}">
+        <p14:creationId xmlns:p14="http://schemas.microsoft.com/office/powerpoint/2010/main" val="3209891368"/>
+      </p:ext>
+    </p:extLst>
+  </p:cSld>
+  <p:clrMapOvr>
+    <a:masterClrMapping/>
+  </p:clrMapOvr>
+</p:sld>
+</file>
+
+<file path=ppt/slides/slide2.xml><?xml version="1.0" encoding="utf-8"?>
+<p:sld xmlns:a="http://schemas.openxmlformats.org/drawingml/2006/main" xmlns:r="http://schemas.openxmlformats.org/officeDocument/2006/relationships" xmlns:p="http://schemas.openxmlformats.org/presentationml/2006/main">
+  <p:cSld>
+    <p:spTree>
+      <p:nvGrpSpPr>
+        <p:cNvPr id="1" name=""/>
+        <p:cNvGrpSpPr/>
+        <p:nvPr/>
+      </p:nvGrpSpPr>
+      <p:grpSpPr>
+        <a:xfrm>
+          <a:off x="0" y="0"/>
+          <a:ext cx="0" cy="0"/>
+          <a:chOff x="0" y="0"/>
+          <a:chExt cx="0" cy="0"/>
+        </a:xfrm>
+      </p:grpSpPr>
+      <p:sp>
+        <p:nvSpPr>
           <p:cNvPr id="28" name="Bogen 27">
             <a:extLst>
               <a:ext uri="{FF2B5EF4-FFF2-40B4-BE49-F238E27FC236}">

</xml_diff>